<commit_message>
Final(ish) version of the slides
</commit_message>
<xml_diff>
--- a/Slides/The Zipper.pptx
+++ b/Slides/The Zipper.pptx
@@ -434,7 +434,7 @@
   <p:cSld>
     <p:spTree>
       <p:nvGrpSpPr>
-        <p:cNvPr name="Shape 83" id="83"/>
+        <p:cNvPr name="Shape 86" id="86"/>
         <p:cNvGrpSpPr/>
         <p:nvPr/>
       </p:nvGrpSpPr>
@@ -448,7 +448,7 @@
       </p:grpSpPr>
       <p:sp>
         <p:nvSpPr>
-          <p:cNvPr name="Shape 84" id="84"/>
+          <p:cNvPr name="Shape 87" id="87"/>
           <p:cNvSpPr/>
           <p:nvPr>
             <p:ph type="sldImg" idx="2"/>
@@ -482,7 +482,7 @@
       </p:sp>
       <p:sp>
         <p:nvSpPr>
-          <p:cNvPr name="Shape 85" id="85"/>
+          <p:cNvPr name="Shape 88" id="88"/>
           <p:cNvSpPr txBox="1"/>
           <p:nvPr>
             <p:ph type="body" idx="1"/>
@@ -518,7 +518,7 @@
   <p:cSld>
     <p:spTree>
       <p:nvGrpSpPr>
-        <p:cNvPr name="Shape 89" id="89"/>
+        <p:cNvPr name="Shape 92" id="92"/>
         <p:cNvGrpSpPr/>
         <p:nvPr/>
       </p:nvGrpSpPr>
@@ -532,7 +532,7 @@
       </p:grpSpPr>
       <p:sp>
         <p:nvSpPr>
-          <p:cNvPr name="Shape 90" id="90"/>
+          <p:cNvPr name="Shape 93" id="93"/>
           <p:cNvSpPr/>
           <p:nvPr>
             <p:ph type="sldImg" idx="2"/>
@@ -566,7 +566,7 @@
       </p:sp>
       <p:sp>
         <p:nvSpPr>
-          <p:cNvPr name="Shape 91" id="91"/>
+          <p:cNvPr name="Shape 94" id="94"/>
           <p:cNvSpPr txBox="1"/>
           <p:nvPr>
             <p:ph type="body" idx="1"/>
@@ -602,7 +602,7 @@
   <p:cSld>
     <p:spTree>
       <p:nvGrpSpPr>
-        <p:cNvPr name="Shape 95" id="95"/>
+        <p:cNvPr name="Shape 98" id="98"/>
         <p:cNvGrpSpPr/>
         <p:nvPr/>
       </p:nvGrpSpPr>
@@ -616,7 +616,7 @@
       </p:grpSpPr>
       <p:sp>
         <p:nvSpPr>
-          <p:cNvPr name="Shape 96" id="96"/>
+          <p:cNvPr name="Shape 99" id="99"/>
           <p:cNvSpPr/>
           <p:nvPr>
             <p:ph type="sldImg" idx="2"/>
@@ -650,7 +650,7 @@
       </p:sp>
       <p:sp>
         <p:nvSpPr>
-          <p:cNvPr name="Shape 97" id="97"/>
+          <p:cNvPr name="Shape 100" id="100"/>
           <p:cNvSpPr txBox="1"/>
           <p:nvPr>
             <p:ph type="body" idx="1"/>
@@ -1190,7 +1190,7 @@
   <p:cSld>
     <p:spTree>
       <p:nvGrpSpPr>
-        <p:cNvPr name="Shape 71" id="71"/>
+        <p:cNvPr name="Shape 72" id="72"/>
         <p:cNvGrpSpPr/>
         <p:nvPr/>
       </p:nvGrpSpPr>
@@ -1204,7 +1204,7 @@
       </p:grpSpPr>
       <p:sp>
         <p:nvSpPr>
-          <p:cNvPr name="Shape 72" id="72"/>
+          <p:cNvPr name="Shape 73" id="73"/>
           <p:cNvSpPr/>
           <p:nvPr>
             <p:ph type="sldImg" idx="2"/>
@@ -1238,7 +1238,7 @@
       </p:sp>
       <p:sp>
         <p:nvSpPr>
-          <p:cNvPr name="Shape 73" id="73"/>
+          <p:cNvPr name="Shape 74" id="74"/>
           <p:cNvSpPr txBox="1"/>
           <p:nvPr>
             <p:ph type="body" idx="1"/>
@@ -1274,7 +1274,7 @@
   <p:cSld>
     <p:spTree>
       <p:nvGrpSpPr>
-        <p:cNvPr name="Shape 77" id="77"/>
+        <p:cNvPr name="Shape 78" id="78"/>
         <p:cNvGrpSpPr/>
         <p:nvPr/>
       </p:nvGrpSpPr>
@@ -1288,7 +1288,7 @@
       </p:grpSpPr>
       <p:sp>
         <p:nvSpPr>
-          <p:cNvPr name="Shape 78" id="78"/>
+          <p:cNvPr name="Shape 79" id="79"/>
           <p:cNvSpPr/>
           <p:nvPr>
             <p:ph type="sldImg" idx="2"/>
@@ -1322,7 +1322,7 @@
       </p:sp>
       <p:sp>
         <p:nvSpPr>
-          <p:cNvPr name="Shape 79" id="79"/>
+          <p:cNvPr name="Shape 80" id="80"/>
           <p:cNvSpPr txBox="1"/>
           <p:nvPr>
             <p:ph type="body" idx="1"/>
@@ -3955,7 +3955,7 @@
   <p:cSld>
     <p:spTree>
       <p:nvGrpSpPr>
-        <p:cNvPr name="Shape 80" id="80"/>
+        <p:cNvPr name="Shape 81" id="81"/>
         <p:cNvGrpSpPr/>
         <p:nvPr/>
       </p:nvGrpSpPr>
@@ -3969,7 +3969,7 @@
       </p:grpSpPr>
       <p:sp>
         <p:nvSpPr>
-          <p:cNvPr name="Shape 81" id="81"/>
+          <p:cNvPr name="Shape 82" id="82"/>
           <p:cNvSpPr txBox="1"/>
           <p:nvPr>
             <p:ph type="title"/>
@@ -3995,14 +3995,14 @@
             </a:pPr>
             <a:r>
               <a:rPr lang="en-GB"/>
-              <a:t>Modifying the Zipper Tree</a:t>
+              <a:t>Modifying the Zipper tree</a:t>
             </a:r>
           </a:p>
         </p:txBody>
       </p:sp>
       <p:sp>
         <p:nvSpPr>
-          <p:cNvPr name="Shape 82" id="82"/>
+          <p:cNvPr name="Shape 83" id="83"/>
           <p:cNvSpPr txBox="1"/>
           <p:nvPr>
             <p:ph type="body" idx="1"/>
@@ -4023,21 +4023,11 @@
           </a:bodyPr>
           <a:lstStyle/>
           <a:p>
-            <a:pPr>
+            <a:pPr rtl="0" lvl="0">
               <a:buNone/>
             </a:pPr>
             <a:r>
               <a:rPr lang="en-GB" sz="1800">
-                <a:latin typeface="Droid Sans Mono"/>
-                <a:ea typeface="Droid Sans Mono"/>
-                <a:cs typeface="Droid Sans Mono"/>
-                <a:sym typeface="Droid Sans Mono"/>
-              </a:rPr>
-              <a:t>
-</a:t>
-            </a:r>
-            <a:r>
-              <a:rPr lang="en-GB" sz="1800">
                 <a:solidFill>
                   <a:srgbClr val="0B5394"/>
                 </a:solidFill>
@@ -4241,9 +4231,78 @@
                 <a:sym typeface="Droid Sans Mono"/>
               </a:rPr>
               <a:t>` (c, t')</a:t>
+            </a:r>
+          </a:p>
+          <a:p>
+            <a:r>
+              <a:t/>
+            </a:r>
+          </a:p>
+          <a:p>
+            <a:r>
+              <a:t/>
+            </a:r>
+          </a:p>
+          <a:p>
+            <a:pPr algn="ctr">
+              <a:buNone/>
+            </a:pPr>
+            <a:r>
+              <a:rPr lang="en-GB" sz="12000"/>
+              <a:t>→</a:t>
             </a:r>
           </a:p>
         </p:txBody>
+      </p:sp>
+      <p:sp>
+        <p:nvSpPr>
+          <p:cNvPr name="Shape 84" id="84"/>
+          <p:cNvSpPr/>
+          <p:nvPr/>
+        </p:nvSpPr>
+        <p:spPr>
+          <a:xfrm>
+            <a:off y="2605500" x="1254887"/>
+            <a:ext cy="3962400" cx="2181225"/>
+          </a:xfrm>
+          <a:prstGeom prst="rect">
+            <a:avLst/>
+          </a:prstGeom>
+          <a:blipFill>
+            <a:blip r:embed="rId3"/>
+            <a:stretch>
+              <a:fillRect/>
+            </a:stretch>
+          </a:blipFill>
+          <a:ln>
+            <a:noFill/>
+          </a:ln>
+        </p:spPr>
+      </p:sp>
+      <p:sp>
+        <p:nvSpPr>
+          <p:cNvPr name="Shape 85" id="85"/>
+          <p:cNvSpPr/>
+          <p:nvPr/>
+        </p:nvSpPr>
+        <p:spPr>
+          <a:xfrm>
+            <a:off y="2605500" x="5639912"/>
+            <a:ext cy="3962400" cx="2181225"/>
+          </a:xfrm>
+          <a:prstGeom prst="rect">
+            <a:avLst/>
+          </a:prstGeom>
+          <a:blipFill>
+            <a:blip r:embed="rId4"/>
+            <a:stretch>
+              <a:fillRect/>
+            </a:stretch>
+          </a:blipFill>
+          <a:ln>
+            <a:noFill/>
+          </a:ln>
+        </p:spPr>
       </p:sp>
     </p:spTree>
   </p:cSld>
@@ -4261,7 +4320,7 @@
   <p:cSld>
     <p:spTree>
       <p:nvGrpSpPr>
-        <p:cNvPr name="Shape 86" id="86"/>
+        <p:cNvPr name="Shape 89" id="89"/>
         <p:cNvGrpSpPr/>
         <p:nvPr/>
       </p:nvGrpSpPr>
@@ -4275,7 +4334,7 @@
       </p:grpSpPr>
       <p:sp>
         <p:nvSpPr>
-          <p:cNvPr name="Shape 87" id="87"/>
+          <p:cNvPr name="Shape 90" id="90"/>
           <p:cNvSpPr txBox="1"/>
           <p:nvPr>
             <p:ph type="title"/>
@@ -4308,7 +4367,7 @@
       </p:sp>
       <p:sp>
         <p:nvSpPr>
-          <p:cNvPr name="Shape 88" id="88"/>
+          <p:cNvPr name="Shape 91" id="91"/>
           <p:cNvSpPr txBox="1"/>
           <p:nvPr>
             <p:ph type="body" idx="1"/>
@@ -4330,11 +4389,80 @@
           <a:lstStyle/>
           <a:p>
             <a:pPr rtl="0" lvl="0">
+              <a:spcAft>
+                <a:spcPts val="1000"/>
+              </a:spcAft>
               <a:buNone/>
             </a:pPr>
             <a:r>
+              <a:rPr lang="en-GB" sz="1000"/>
+              <a:t>
+</a:t>
+            </a:r>
+            <a:r>
               <a:rPr lang="en-GB"/>
-              <a:t>Performance improvements :)</a:t>
+              <a:t>We still have a tree that we can traverse and gives us access to our focal point, but we now have:</a:t>
+            </a:r>
+          </a:p>
+          <a:p>
+            <a:r>
+              <a:t/>
+            </a:r>
+          </a:p>
+          <a:p>
+            <a:pPr indent="-419100" marL="914400" rtl="0" lvl="0">
+              <a:lnSpc>
+                <a:spcPct val="115000"/>
+              </a:lnSpc>
+              <a:buClr>
+                <a:srgbClr val="000000"/>
+              </a:buClr>
+              <a:buSzPct val="166666"/>
+              <a:buFont typeface="Arial"/>
+              <a:buChar char="•"/>
+            </a:pPr>
+            <a:r>
+              <a:rPr lang="en-GB"/>
+              <a:t>O(1) Access to our focus of interest.</a:t>
+            </a:r>
+          </a:p>
+          <a:p>
+            <a:pPr indent="-419100" marL="914400" rtl="0" lvl="0">
+              <a:lnSpc>
+                <a:spcPct val="115000"/>
+              </a:lnSpc>
+              <a:buClr>
+                <a:srgbClr val="000000"/>
+              </a:buClr>
+              <a:buSzPct val="166666"/>
+              <a:buFont typeface="Arial"/>
+              <a:buChar char="•"/>
+            </a:pPr>
+            <a:r>
+              <a:rPr lang="en-GB"/>
+              <a:t>Cheap movements around the type.</a:t>
+            </a:r>
+          </a:p>
+          <a:p>
+            <a:pPr indent="-419100" marL="914400" rtl="0" lvl="0">
+              <a:lnSpc>
+                <a:spcPct val="115000"/>
+              </a:lnSpc>
+              <a:buClr>
+                <a:srgbClr val="000000"/>
+              </a:buClr>
+              <a:buSzPct val="166666"/>
+              <a:buFont typeface="Arial"/>
+              <a:buChar char="•"/>
+            </a:pPr>
+            <a:r>
+              <a:rPr lang="en-GB"/>
+              <a:t>Efficient tree modifications.</a:t>
+            </a:r>
+          </a:p>
+          <a:p>
+            <a:r>
+              <a:t/>
             </a:r>
           </a:p>
           <a:p>
@@ -4343,7 +4471,7 @@
             </a:pPr>
             <a:r>
               <a:rPr lang="en-GB"/>
-              <a:t>We've had some fun with data types</a:t>
+              <a:t>We've also had some fun with data types :)</a:t>
             </a:r>
           </a:p>
         </p:txBody>
@@ -4364,7 +4492,7 @@
   <p:cSld>
     <p:spTree>
       <p:nvGrpSpPr>
-        <p:cNvPr name="Shape 92" id="92"/>
+        <p:cNvPr name="Shape 95" id="95"/>
         <p:cNvGrpSpPr/>
         <p:nvPr/>
       </p:nvGrpSpPr>
@@ -4378,7 +4506,7 @@
       </p:grpSpPr>
       <p:sp>
         <p:nvSpPr>
-          <p:cNvPr name="Shape 93" id="93"/>
+          <p:cNvPr name="Shape 96" id="96"/>
           <p:cNvSpPr txBox="1"/>
           <p:nvPr>
             <p:ph type="title"/>
@@ -4404,14 +4532,14 @@
             </a:pPr>
             <a:r>
               <a:rPr lang="en-GB"/>
-              <a:t>Further Reading</a:t>
+              <a:t>Further reading</a:t>
             </a:r>
           </a:p>
         </p:txBody>
       </p:sp>
       <p:sp>
         <p:nvSpPr>
-          <p:cNvPr name="Shape 94" id="94"/>
+          <p:cNvPr name="Shape 97" id="97"/>
           <p:cNvSpPr txBox="1"/>
           <p:nvPr>
             <p:ph type="body" idx="1"/>
@@ -4483,7 +4611,7 @@
             </a:pPr>
             <a:r>
               <a:rPr lang="en-GB" sz="1800"/>
-              <a:t>"The Zipper", Gerard Huet</a:t>
+              <a:t>"The Zipper", Gérard Huet</a:t>
             </a:r>
           </a:p>
           <a:p>
@@ -4592,7 +4720,7 @@
             </a:pPr>
             <a:r>
               <a:rPr lang="en-GB" sz="1800"/>
-              <a:t>"The Derivative of a Regular Type is its Type of One-Hole Contexts",</a:t>
+              <a:t>"The Derivative of a Regular Type is its Type of One-Hole Contexts"</a:t>
             </a:r>
           </a:p>
           <a:p>
@@ -4694,44 +4822,11 @@
           <a:lstStyle/>
           <a:p>
             <a:pPr rtl="0" lvl="0">
-              <a:buClr>
-                <a:srgbClr val="000000"/>
-              </a:buClr>
-              <a:buSzPct val="36666"/>
-              <a:buFont typeface="Arial"/>
               <a:buNone/>
             </a:pPr>
             <a:r>
               <a:rPr lang="en-GB"/>
-              <a:t>This presentation introduces the Zipper in the context of a simple binary search tree, but...</a:t>
-            </a:r>
-          </a:p>
-          <a:p>
-            <a:r>
-              <a:t/>
-            </a:r>
-          </a:p>
-          <a:p>
-            <a:pPr rtl="0" lvl="0">
-              <a:buNone/>
-            </a:pPr>
-            <a:r>
-              <a:rPr lang="en-GB"/>
-              <a:t>the Zipper can be applied to any inductively defined data type.</a:t>
-            </a:r>
-          </a:p>
-          <a:p>
-            <a:r>
-              <a:t/>
-            </a:r>
-          </a:p>
-          <a:p>
-            <a:pPr rtl="0" lvl="0">
-              <a:buNone/>
-            </a:pPr>
-            <a:r>
-              <a:rPr lang="en-GB"/>
-              <a:t>It's useful when you want to maintain the structure of a type, but have O(1) access to an arbitrary focal point, e.g.</a:t>
+              <a:t>A Zipper is useful when you want to maintain a focal point within an inductively defined data type. Example usages include:</a:t>
             </a:r>
           </a:p>
           <a:p>
@@ -4745,7 +4840,7 @@
             </a:pPr>
             <a:r>
               <a:rPr lang="en-GB"/>
-              <a:t>Editors</a:t>
+              <a:t>Text Editors</a:t>
             </a:r>
           </a:p>
           <a:p>
@@ -4765,6 +4860,34 @@
           <a:p>
             <a:r>
               <a:t/>
+            </a:r>
+          </a:p>
+          <a:p>
+            <a:pPr rtl="0" lvl="0">
+              <a:buClr>
+                <a:srgbClr val="000000"/>
+              </a:buClr>
+              <a:buSzPct val="36666"/>
+              <a:buFont typeface="Arial"/>
+              <a:buNone/>
+            </a:pPr>
+            <a:r>
+              <a:rPr lang="en-GB"/>
+              <a:t>This presentation introduces the Zipper in the context of a simple binary search tree, but...</a:t>
+            </a:r>
+          </a:p>
+          <a:p>
+            <a:r>
+              <a:t/>
+            </a:r>
+          </a:p>
+          <a:p>
+            <a:pPr rtl="0" lvl="0">
+              <a:buNone/>
+            </a:pPr>
+            <a:r>
+              <a:rPr lang="en-GB"/>
+              <a:t>the Zipper can be applied to any inductively defined data type.</a:t>
             </a:r>
           </a:p>
         </p:txBody>
@@ -4825,7 +4948,7 @@
             </a:pPr>
             <a:r>
               <a:rPr lang="en-GB"/>
-              <a:t>A Simple Binary Search Tree</a:t>
+              <a:t>A simple binary search tree</a:t>
             </a:r>
           </a:p>
         </p:txBody>
@@ -4863,44 +4986,11 @@
                 <a:cs typeface="Droid Sans Mono"/>
                 <a:sym typeface="Droid Sans Mono"/>
               </a:rPr>
-              <a:t>           data </a:t>
-            </a:r>
-            <a:r>
-              <a:rPr lang="en-GB" sz="1800">
-                <a:solidFill>
-                  <a:srgbClr val="980000"/>
-                </a:solidFill>
-                <a:latin typeface="Droid Sans Mono"/>
-                <a:ea typeface="Droid Sans Mono"/>
-                <a:cs typeface="Droid Sans Mono"/>
-                <a:sym typeface="Droid Sans Mono"/>
-              </a:rPr>
-              <a:t>Tree</a:t>
-            </a:r>
-            <a:r>
-              <a:rPr lang="en-GB" sz="1800">
-                <a:latin typeface="Droid Sans Mono"/>
-                <a:ea typeface="Droid Sans Mono"/>
-                <a:cs typeface="Droid Sans Mono"/>
-                <a:sym typeface="Droid Sans Mono"/>
-              </a:rPr>
-              <a:t> a = </a:t>
-            </a:r>
-            <a:r>
-              <a:rPr lang="en-GB" sz="1800">
-                <a:solidFill>
-                  <a:srgbClr val="980000"/>
-                </a:solidFill>
-                <a:latin typeface="Droid Sans Mono"/>
-                <a:ea typeface="Droid Sans Mono"/>
-                <a:cs typeface="Droid Sans Mono"/>
-                <a:sym typeface="Droid Sans Mono"/>
-              </a:rPr>
-              <a:t>Leaf</a:t>
+              <a:t>           </a:t>
             </a:r>
           </a:p>
           <a:p>
-            <a:pPr algn="ctr">
+            <a:pPr rtl="0" lvl="0">
               <a:buNone/>
             </a:pPr>
             <a:r>
@@ -4910,7 +5000,54 @@
                 <a:cs typeface="Droid Sans Mono"/>
                 <a:sym typeface="Droid Sans Mono"/>
               </a:rPr>
-              <a:t>            | </a:t>
+              <a:t>           data </a:t>
+            </a:r>
+            <a:r>
+              <a:rPr lang="en-GB" sz="1800">
+                <a:solidFill>
+                  <a:srgbClr val="980000"/>
+                </a:solidFill>
+                <a:latin typeface="Droid Sans Mono"/>
+                <a:ea typeface="Droid Sans Mono"/>
+                <a:cs typeface="Droid Sans Mono"/>
+                <a:sym typeface="Droid Sans Mono"/>
+              </a:rPr>
+              <a:t>Tree</a:t>
+            </a:r>
+            <a:r>
+              <a:rPr lang="en-GB" sz="1800">
+                <a:latin typeface="Droid Sans Mono"/>
+                <a:ea typeface="Droid Sans Mono"/>
+                <a:cs typeface="Droid Sans Mono"/>
+                <a:sym typeface="Droid Sans Mono"/>
+              </a:rPr>
+              <a:t> a = </a:t>
+            </a:r>
+            <a:r>
+              <a:rPr lang="en-GB" sz="1800">
+                <a:solidFill>
+                  <a:srgbClr val="980000"/>
+                </a:solidFill>
+                <a:latin typeface="Droid Sans Mono"/>
+                <a:ea typeface="Droid Sans Mono"/>
+                <a:cs typeface="Droid Sans Mono"/>
+                <a:sym typeface="Droid Sans Mono"/>
+              </a:rPr>
+              <a:t>Leaf</a:t>
+            </a:r>
+          </a:p>
+          <a:p>
+            <a:pPr>
+              <a:buNone/>
+            </a:pPr>
+            <a:r>
+              <a:rPr lang="en-GB" sz="1800">
+                <a:latin typeface="Droid Sans Mono"/>
+                <a:ea typeface="Droid Sans Mono"/>
+                <a:cs typeface="Droid Sans Mono"/>
+                <a:sym typeface="Droid Sans Mono"/>
+              </a:rPr>
+              <a:t>                       | </a:t>
             </a:r>
             <a:r>
               <a:rPr lang="en-GB" sz="1800">
@@ -4986,7 +5123,7 @@
         </p:nvSpPr>
         <p:spPr>
           <a:xfrm>
-            <a:off y="2875812" x="3409950"/>
+            <a:off y="3083512" x="3409950"/>
             <a:ext cy="3019425" cx="2324100"/>
           </a:xfrm>
           <a:prstGeom prst="rect">
@@ -5059,7 +5196,7 @@
             </a:pPr>
             <a:r>
               <a:rPr lang="en-GB"/>
-              <a:t>Adding a Focus of Interest</a:t>
+              <a:t>Adding a focus of interest</a:t>
             </a:r>
           </a:p>
         </p:txBody>
@@ -5092,7 +5229,7 @@
             </a:pPr>
             <a:r>
               <a:rPr lang="en-GB"/>
-              <a:t>Now we need to add a focus of interest to our tree. For this, we'll need a way of describing a path to the node we're currently interested in:</a:t>
+              <a:t>Now we need to add a focus of interest to our tree. A simple approach might be to describe a path to the node we're currently interested in:</a:t>
             </a:r>
           </a:p>
           <a:p>
@@ -5387,7 +5524,7 @@
             </a:pPr>
             <a:r>
               <a:rPr lang="en-GB"/>
-              <a:t>Modifying the Tree</a:t>
+              <a:t>Modifying the tree</a:t>
             </a:r>
           </a:p>
         </p:txBody>
@@ -6371,7 +6508,7 @@
             </a:pPr>
             <a:r>
               <a:rPr lang="en-GB"/>
-              <a:t>Problem with this Approach</a:t>
+              <a:t>Problem with this approach</a:t>
             </a:r>
           </a:p>
         </p:txBody>
@@ -6446,7 +6583,7 @@
         </p:nvSpPr>
         <p:spPr>
           <a:xfrm>
-            <a:off y="3038237" x="1229987"/>
+            <a:off y="3038237" x="1133662"/>
             <a:ext cy="3019425" cx="2695575"/>
           </a:xfrm>
           <a:prstGeom prst="rect">
@@ -6471,7 +6608,7 @@
         </p:nvSpPr>
         <p:spPr>
           <a:xfrm>
-            <a:off y="3038237" x="5573362"/>
+            <a:off y="3038237" x="5755837"/>
             <a:ext cy="3019425" cx="2238375"/>
           </a:xfrm>
           <a:prstGeom prst="rect">
@@ -6573,11 +6710,67 @@
           <a:lstStyle/>
           <a:p>
             <a:pPr rtl="0" lvl="0">
+              <a:lnSpc>
+                <a:spcPct val="100000"/>
+              </a:lnSpc>
+              <a:spcAft>
+                <a:spcPts val="1000"/>
+              </a:spcAft>
               <a:buNone/>
             </a:pPr>
             <a:r>
+              <a:rPr lang="en-GB" sz="1000"/>
+              <a:t>
+</a:t>
+            </a:r>
+            <a:r>
               <a:rPr lang="en-GB"/>
-              <a:t>We can't avoid the cost of modifying the bit of the Tree that we're interested in, but can we avoid the cost of getting to it?</a:t>
+              <a:t>Modifying the tree is expensive, but how can we improve the situation?</a:t>
+            </a:r>
+          </a:p>
+          <a:p>
+            <a:pPr rtl="0" lvl="0">
+              <a:buNone/>
+            </a:pPr>
+            <a:r>
+              <a:rPr lang="en-GB"/>
+              <a:t>We can't avoid the cost of modifying the bit of the Tree that we're interested in, but can we;</a:t>
+            </a:r>
+          </a:p>
+          <a:p>
+            <a:r>
+              <a:t/>
+            </a:r>
+          </a:p>
+          <a:p>
+            <a:pPr indent="-419100" marL="914400" rtl="0" lvl="0">
+              <a:lnSpc>
+                <a:spcPct val="115000"/>
+              </a:lnSpc>
+              <a:buClr>
+                <a:srgbClr val="000000"/>
+              </a:buClr>
+              <a:buSzPct val="166666"/>
+              <a:buFont typeface="Arial"/>
+              <a:buChar char="•"/>
+            </a:pPr>
+            <a:r>
+              <a:rPr lang="en-GB"/>
+              <a:t>avoid the cost of traversing the tree?</a:t>
+            </a:r>
+          </a:p>
+          <a:p>
+            <a:pPr indent="-419100" marL="914400" rtl="0" lvl="0">
+              <a:buClr>
+                <a:srgbClr val="000000"/>
+              </a:buClr>
+              <a:buSzPct val="166666"/>
+              <a:buFont typeface="Arial"/>
+              <a:buChar char="•"/>
+            </a:pPr>
+            <a:r>
+              <a:rPr lang="en-GB"/>
+              <a:t>move the focal point cheaply?</a:t>
             </a:r>
           </a:p>
           <a:p>
@@ -6652,7 +6845,7 @@
             </a:pPr>
             <a:r>
               <a:rPr lang="en-GB"/>
-              <a:t>Keeping Things in Context</a:t>
+              <a:t>Keeping things in context</a:t>
             </a:r>
           </a:p>
         </p:txBody>
@@ -6668,7 +6861,7 @@
         <p:spPr>
           <a:xfrm>
             <a:off y="1600200" x="457200"/>
-            <a:ext cy="4967700" cx="8229600"/>
+            <a:ext cy="4967700" cx="5688599"/>
           </a:xfrm>
           <a:prstGeom prst="rect">
             <a:avLst/>
@@ -6690,16 +6883,8 @@
               <a:buNone/>
             </a:pPr>
             <a:r>
-              <a:rPr lang="en-GB"/>
-              <a:t>First, let's throw away the simple idea of "directions" to our focal point. Instead, let's build a data type that keeps track of our movements around the tree, and crucially, the bits of the tree we chose </a:t>
-            </a:r>
-            <a:r>
-              <a:rPr lang="en-GB" b="1"/>
-              <a:t>NOT</a:t>
-            </a:r>
-            <a:r>
-              <a:rPr lang="en-GB"/>
-              <a:t> to look at:</a:t>
+              <a:rPr lang="en-GB" sz="2400"/>
+              <a:t>First, let's throw away the simple idea of "directions" to our focal point. Instead, let's build a data type that keeps track of our movements around the tree:</a:t>
             </a:r>
           </a:p>
           <a:p>
@@ -6728,6 +6913,218 @@
                 <a:spcPts val="0"/>
               </a:spcBef>
               <a:spcAft>
+                <a:spcPts val="0"/>
+              </a:spcAft>
+              <a:buNone/>
+            </a:pPr>
+            <a:r>
+              <a:rPr lang="en-GB" sz="1800">
+                <a:latin typeface="Droid Sans Mono"/>
+                <a:ea typeface="Droid Sans Mono"/>
+                <a:cs typeface="Droid Sans Mono"/>
+                <a:sym typeface="Droid Sans Mono"/>
+              </a:rPr>
+              <a:t>  data </a:t>
+            </a:r>
+            <a:r>
+              <a:rPr lang="en-GB" sz="1800">
+                <a:solidFill>
+                  <a:srgbClr val="980000"/>
+                </a:solidFill>
+                <a:latin typeface="Droid Sans Mono"/>
+                <a:ea typeface="Droid Sans Mono"/>
+                <a:cs typeface="Droid Sans Mono"/>
+                <a:sym typeface="Droid Sans Mono"/>
+              </a:rPr>
+              <a:t>Context</a:t>
+            </a:r>
+            <a:r>
+              <a:rPr lang="en-GB" sz="1800">
+                <a:latin typeface="Droid Sans Mono"/>
+                <a:ea typeface="Droid Sans Mono"/>
+                <a:cs typeface="Droid Sans Mono"/>
+                <a:sym typeface="Droid Sans Mono"/>
+              </a:rPr>
+              <a:t> a = </a:t>
+            </a:r>
+            <a:r>
+              <a:rPr lang="en-GB" sz="1800">
+                <a:solidFill>
+                  <a:srgbClr val="980000"/>
+                </a:solidFill>
+                <a:latin typeface="Droid Sans Mono"/>
+                <a:ea typeface="Droid Sans Mono"/>
+                <a:cs typeface="Droid Sans Mono"/>
+                <a:sym typeface="Droid Sans Mono"/>
+              </a:rPr>
+              <a:t>CRoot</a:t>
+            </a:r>
+            <a:br>
+              <a:rPr lang="en-GB" sz="1800">
+                <a:latin typeface="Droid Sans Mono"/>
+                <a:ea typeface="Droid Sans Mono"/>
+                <a:cs typeface="Droid Sans Mono"/>
+                <a:sym typeface="Droid Sans Mono"/>
+              </a:rPr>
+            </a:br>
+            <a:r>
+              <a:rPr lang="en-GB" sz="1800">
+                <a:latin typeface="Droid Sans Mono"/>
+                <a:ea typeface="Droid Sans Mono"/>
+                <a:cs typeface="Droid Sans Mono"/>
+                <a:sym typeface="Droid Sans Mono"/>
+              </a:rPr>
+              <a:t>                 | </a:t>
+            </a:r>
+            <a:r>
+              <a:rPr lang="en-GB" sz="1800">
+                <a:solidFill>
+                  <a:srgbClr val="980000"/>
+                </a:solidFill>
+                <a:latin typeface="Droid Sans Mono"/>
+                <a:ea typeface="Droid Sans Mono"/>
+                <a:cs typeface="Droid Sans Mono"/>
+                <a:sym typeface="Droid Sans Mono"/>
+              </a:rPr>
+              <a:t>CLeft</a:t>
+            </a:r>
+            <a:r>
+              <a:rPr lang="en-GB" sz="1800">
+                <a:latin typeface="Droid Sans Mono"/>
+                <a:ea typeface="Droid Sans Mono"/>
+                <a:cs typeface="Droid Sans Mono"/>
+                <a:sym typeface="Droid Sans Mono"/>
+              </a:rPr>
+              <a:t> (</a:t>
+            </a:r>
+            <a:r>
+              <a:rPr lang="en-GB" sz="1800">
+                <a:solidFill>
+                  <a:srgbClr val="980000"/>
+                </a:solidFill>
+                <a:latin typeface="Droid Sans Mono"/>
+                <a:ea typeface="Droid Sans Mono"/>
+                <a:cs typeface="Droid Sans Mono"/>
+                <a:sym typeface="Droid Sans Mono"/>
+              </a:rPr>
+              <a:t>Context</a:t>
+            </a:r>
+            <a:r>
+              <a:rPr lang="en-GB" sz="1800">
+                <a:latin typeface="Droid Sans Mono"/>
+                <a:ea typeface="Droid Sans Mono"/>
+                <a:cs typeface="Droid Sans Mono"/>
+                <a:sym typeface="Droid Sans Mono"/>
+              </a:rPr>
+              <a:t> a) </a:t>
+            </a:r>
+          </a:p>
+          <a:p>
+            <a:pPr rtl="0" lvl="0">
+              <a:spcBef>
+                <a:spcPts val="0"/>
+              </a:spcBef>
+              <a:spcAft>
+                <a:spcPts val="0"/>
+              </a:spcAft>
+              <a:buNone/>
+            </a:pPr>
+            <a:r>
+              <a:rPr lang="en-GB" sz="1800">
+                <a:latin typeface="Droid Sans Mono"/>
+                <a:ea typeface="Droid Sans Mono"/>
+                <a:cs typeface="Droid Sans Mono"/>
+                <a:sym typeface="Droid Sans Mono"/>
+              </a:rPr>
+              <a:t>                         (a, </a:t>
+            </a:r>
+            <a:r>
+              <a:rPr lang="en-GB" sz="1800">
+                <a:solidFill>
+                  <a:srgbClr val="980000"/>
+                </a:solidFill>
+                <a:latin typeface="Droid Sans Mono"/>
+                <a:ea typeface="Droid Sans Mono"/>
+                <a:cs typeface="Droid Sans Mono"/>
+                <a:sym typeface="Droid Sans Mono"/>
+              </a:rPr>
+              <a:t>Tree</a:t>
+            </a:r>
+            <a:r>
+              <a:rPr lang="en-GB" sz="1800">
+                <a:latin typeface="Droid Sans Mono"/>
+                <a:ea typeface="Droid Sans Mono"/>
+                <a:cs typeface="Droid Sans Mono"/>
+                <a:sym typeface="Droid Sans Mono"/>
+              </a:rPr>
+              <a:t> a)</a:t>
+            </a:r>
+            <a:br>
+              <a:rPr lang="en-GB" sz="1800">
+                <a:latin typeface="Droid Sans Mono"/>
+                <a:ea typeface="Droid Sans Mono"/>
+                <a:cs typeface="Droid Sans Mono"/>
+                <a:sym typeface="Droid Sans Mono"/>
+              </a:rPr>
+            </a:br>
+            <a:r>
+              <a:rPr lang="en-GB" sz="1800">
+                <a:latin typeface="Droid Sans Mono"/>
+                <a:ea typeface="Droid Sans Mono"/>
+                <a:cs typeface="Droid Sans Mono"/>
+                <a:sym typeface="Droid Sans Mono"/>
+              </a:rPr>
+              <a:t>                 | </a:t>
+            </a:r>
+            <a:r>
+              <a:rPr lang="en-GB" sz="1800">
+                <a:solidFill>
+                  <a:srgbClr val="980000"/>
+                </a:solidFill>
+                <a:latin typeface="Droid Sans Mono"/>
+                <a:ea typeface="Droid Sans Mono"/>
+                <a:cs typeface="Droid Sans Mono"/>
+                <a:sym typeface="Droid Sans Mono"/>
+              </a:rPr>
+              <a:t>CRight</a:t>
+            </a:r>
+            <a:r>
+              <a:rPr lang="en-GB" sz="1800">
+                <a:latin typeface="Droid Sans Mono"/>
+                <a:ea typeface="Droid Sans Mono"/>
+                <a:cs typeface="Droid Sans Mono"/>
+                <a:sym typeface="Droid Sans Mono"/>
+              </a:rPr>
+              <a:t> (</a:t>
+            </a:r>
+            <a:r>
+              <a:rPr lang="en-GB" sz="1800">
+                <a:solidFill>
+                  <a:srgbClr val="980000"/>
+                </a:solidFill>
+                <a:latin typeface="Droid Sans Mono"/>
+                <a:ea typeface="Droid Sans Mono"/>
+                <a:cs typeface="Droid Sans Mono"/>
+                <a:sym typeface="Droid Sans Mono"/>
+              </a:rPr>
+              <a:t>Context</a:t>
+            </a:r>
+            <a:r>
+              <a:rPr lang="en-GB" sz="1800">
+                <a:latin typeface="Droid Sans Mono"/>
+                <a:ea typeface="Droid Sans Mono"/>
+                <a:cs typeface="Droid Sans Mono"/>
+                <a:sym typeface="Droid Sans Mono"/>
+              </a:rPr>
+              <a:t> a) </a:t>
+            </a:r>
+          </a:p>
+          <a:p>
+            <a:pPr rtl="0" lvl="0">
+              <a:spcBef>
+                <a:spcPts val="0"/>
+              </a:spcBef>
+              <a:spcAft>
                 <a:spcPts val="1000"/>
               </a:spcAft>
               <a:buNone/>
@@ -6739,7 +7136,7 @@
                 <a:cs typeface="Droid Sans Mono"/>
                 <a:sym typeface="Droid Sans Mono"/>
               </a:rPr>
-              <a:t>     data </a:t>
+              <a:t>                          (a, </a:t>
             </a:r>
             <a:r>
               <a:rPr lang="en-GB" sz="1800">
@@ -6751,98 +7148,6 @@
                 <a:cs typeface="Droid Sans Mono"/>
                 <a:sym typeface="Droid Sans Mono"/>
               </a:rPr>
-              <a:t>Context</a:t>
-            </a:r>
-            <a:r>
-              <a:rPr lang="en-GB" sz="1800">
-                <a:latin typeface="Droid Sans Mono"/>
-                <a:ea typeface="Droid Sans Mono"/>
-                <a:cs typeface="Droid Sans Mono"/>
-                <a:sym typeface="Droid Sans Mono"/>
-              </a:rPr>
-              <a:t> a = </a:t>
-            </a:r>
-            <a:r>
-              <a:rPr lang="en-GB" sz="1800">
-                <a:solidFill>
-                  <a:srgbClr val="980000"/>
-                </a:solidFill>
-                <a:latin typeface="Droid Sans Mono"/>
-                <a:ea typeface="Droid Sans Mono"/>
-                <a:cs typeface="Droid Sans Mono"/>
-                <a:sym typeface="Droid Sans Mono"/>
-              </a:rPr>
-              <a:t>CRoot</a:t>
-            </a:r>
-            <a:br>
-              <a:rPr lang="en-GB" sz="1800">
-                <a:latin typeface="Droid Sans Mono"/>
-                <a:ea typeface="Droid Sans Mono"/>
-                <a:cs typeface="Droid Sans Mono"/>
-                <a:sym typeface="Droid Sans Mono"/>
-              </a:rPr>
-            </a:br>
-            <a:r>
-              <a:rPr lang="en-GB" sz="1800">
-                <a:latin typeface="Droid Sans Mono"/>
-                <a:ea typeface="Droid Sans Mono"/>
-                <a:cs typeface="Droid Sans Mono"/>
-                <a:sym typeface="Droid Sans Mono"/>
-              </a:rPr>
-              <a:t>                    | </a:t>
-            </a:r>
-            <a:r>
-              <a:rPr lang="en-GB" sz="1800">
-                <a:solidFill>
-                  <a:srgbClr val="980000"/>
-                </a:solidFill>
-                <a:latin typeface="Droid Sans Mono"/>
-                <a:ea typeface="Droid Sans Mono"/>
-                <a:cs typeface="Droid Sans Mono"/>
-                <a:sym typeface="Droid Sans Mono"/>
-              </a:rPr>
-              <a:t>CLeft</a:t>
-            </a:r>
-            <a:r>
-              <a:rPr lang="en-GB" sz="1800">
-                <a:latin typeface="Droid Sans Mono"/>
-                <a:ea typeface="Droid Sans Mono"/>
-                <a:cs typeface="Droid Sans Mono"/>
-                <a:sym typeface="Droid Sans Mono"/>
-              </a:rPr>
-              <a:t> (</a:t>
-            </a:r>
-            <a:r>
-              <a:rPr lang="en-GB" sz="1800">
-                <a:solidFill>
-                  <a:srgbClr val="980000"/>
-                </a:solidFill>
-                <a:latin typeface="Droid Sans Mono"/>
-                <a:ea typeface="Droid Sans Mono"/>
-                <a:cs typeface="Droid Sans Mono"/>
-                <a:sym typeface="Droid Sans Mono"/>
-              </a:rPr>
-              <a:t>Context</a:t>
-            </a:r>
-            <a:r>
-              <a:rPr lang="en-GB" sz="1800">
-                <a:latin typeface="Droid Sans Mono"/>
-                <a:ea typeface="Droid Sans Mono"/>
-                <a:cs typeface="Droid Sans Mono"/>
-                <a:sym typeface="Droid Sans Mono"/>
-              </a:rPr>
-              <a:t> a) (a,(</a:t>
-            </a:r>
-            <a:r>
-              <a:rPr lang="en-GB" sz="1800">
-                <a:solidFill>
-                  <a:srgbClr val="980000"/>
-                </a:solidFill>
-                <a:latin typeface="Droid Sans Mono"/>
-                <a:ea typeface="Droid Sans Mono"/>
-                <a:cs typeface="Droid Sans Mono"/>
-                <a:sym typeface="Droid Sans Mono"/>
-              </a:rPr>
               <a:t>Tree</a:t>
             </a:r>
             <a:r>
@@ -6852,87 +7157,7 @@
                 <a:cs typeface="Droid Sans Mono"/>
                 <a:sym typeface="Droid Sans Mono"/>
               </a:rPr>
-              <a:t> a))</a:t>
-            </a:r>
-            <a:br>
-              <a:rPr lang="en-GB" sz="1800">
-                <a:latin typeface="Droid Sans Mono"/>
-                <a:ea typeface="Droid Sans Mono"/>
-                <a:cs typeface="Droid Sans Mono"/>
-                <a:sym typeface="Droid Sans Mono"/>
-              </a:rPr>
-            </a:br>
-            <a:r>
-              <a:rPr lang="en-GB" sz="1800">
-                <a:latin typeface="Droid Sans Mono"/>
-                <a:ea typeface="Droid Sans Mono"/>
-                <a:cs typeface="Droid Sans Mono"/>
-                <a:sym typeface="Droid Sans Mono"/>
-              </a:rPr>
-              <a:t>                    | </a:t>
-            </a:r>
-            <a:r>
-              <a:rPr lang="en-GB" sz="1800">
-                <a:solidFill>
-                  <a:srgbClr val="980000"/>
-                </a:solidFill>
-                <a:latin typeface="Droid Sans Mono"/>
-                <a:ea typeface="Droid Sans Mono"/>
-                <a:cs typeface="Droid Sans Mono"/>
-                <a:sym typeface="Droid Sans Mono"/>
-              </a:rPr>
-              <a:t>CRight</a:t>
-            </a:r>
-            <a:r>
-              <a:rPr lang="en-GB" sz="1800">
-                <a:latin typeface="Droid Sans Mono"/>
-                <a:ea typeface="Droid Sans Mono"/>
-                <a:cs typeface="Droid Sans Mono"/>
-                <a:sym typeface="Droid Sans Mono"/>
-              </a:rPr>
-              <a:t> (</a:t>
-            </a:r>
-            <a:r>
-              <a:rPr lang="en-GB" sz="1800">
-                <a:solidFill>
-                  <a:srgbClr val="980000"/>
-                </a:solidFill>
-                <a:latin typeface="Droid Sans Mono"/>
-                <a:ea typeface="Droid Sans Mono"/>
-                <a:cs typeface="Droid Sans Mono"/>
-                <a:sym typeface="Droid Sans Mono"/>
-              </a:rPr>
-              <a:t>Context</a:t>
-            </a:r>
-            <a:r>
-              <a:rPr lang="en-GB" sz="1800">
-                <a:latin typeface="Droid Sans Mono"/>
-                <a:ea typeface="Droid Sans Mono"/>
-                <a:cs typeface="Droid Sans Mono"/>
-                <a:sym typeface="Droid Sans Mono"/>
-              </a:rPr>
-              <a:t> a) (a,(</a:t>
-            </a:r>
-            <a:r>
-              <a:rPr lang="en-GB" sz="1800">
-                <a:solidFill>
-                  <a:srgbClr val="980000"/>
-                </a:solidFill>
-                <a:latin typeface="Droid Sans Mono"/>
-                <a:ea typeface="Droid Sans Mono"/>
-                <a:cs typeface="Droid Sans Mono"/>
-                <a:sym typeface="Droid Sans Mono"/>
-              </a:rPr>
-              <a:t>Tree</a:t>
-            </a:r>
-            <a:r>
-              <a:rPr lang="en-GB" sz="1800">
-                <a:latin typeface="Droid Sans Mono"/>
-                <a:ea typeface="Droid Sans Mono"/>
-                <a:cs typeface="Droid Sans Mono"/>
-                <a:sym typeface="Droid Sans Mono"/>
-              </a:rPr>
-              <a:t> a))</a:t>
+              <a:t> a)</a:t>
             </a:r>
           </a:p>
           <a:p>
@@ -6949,7 +7174,7 @@
                 <a:cs typeface="Droid Sans Mono"/>
                 <a:sym typeface="Droid Sans Mono"/>
               </a:rPr>
-              <a:t>     type </a:t>
+              <a:t>  type </a:t>
             </a:r>
             <a:r>
               <a:rPr lang="en-GB" sz="1800">
@@ -7029,7 +7254,7 @@
                 <a:cs typeface="Droid Sans Mono"/>
                 <a:sym typeface="Droid Sans Mono"/>
               </a:rPr>
-              <a:t>     mkZipTree</a:t>
+              <a:t>  mkZipTree</a:t>
             </a:r>
             <a:r>
               <a:rPr lang="en-GB" sz="1800">
@@ -7097,7 +7322,7 @@
                 <a:cs typeface="Droid Sans Mono"/>
                 <a:sym typeface="Droid Sans Mono"/>
               </a:rPr>
-              <a:t>     </a:t>
+              <a:t>  </a:t>
             </a:r>
             <a:r>
               <a:rPr lang="en-GB" sz="1800">
@@ -7143,6 +7368,31 @@
             </a:r>
           </a:p>
         </p:txBody>
+      </p:sp>
+      <p:sp>
+        <p:nvSpPr>
+          <p:cNvPr name="Shape 71" id="71"/>
+          <p:cNvSpPr/>
+          <p:nvPr/>
+        </p:nvSpPr>
+        <p:spPr>
+          <a:xfrm>
+            <a:off y="2138100" x="6276125"/>
+            <a:ext cy="3962400" cx="2181225"/>
+          </a:xfrm>
+          <a:prstGeom prst="rect">
+            <a:avLst/>
+          </a:prstGeom>
+          <a:blipFill>
+            <a:blip r:embed="rId3"/>
+            <a:stretch>
+              <a:fillRect/>
+            </a:stretch>
+          </a:blipFill>
+          <a:ln>
+            <a:noFill/>
+          </a:ln>
+        </p:spPr>
       </p:sp>
     </p:spTree>
   </p:cSld>
@@ -7160,7 +7410,7 @@
   <p:cSld>
     <p:spTree>
       <p:nvGrpSpPr>
-        <p:cNvPr name="Shape 74" id="74"/>
+        <p:cNvPr name="Shape 75" id="75"/>
         <p:cNvGrpSpPr/>
         <p:nvPr/>
       </p:nvGrpSpPr>
@@ -7174,7 +7424,7 @@
       </p:grpSpPr>
       <p:sp>
         <p:nvSpPr>
-          <p:cNvPr name="Shape 75" id="75"/>
+          <p:cNvPr name="Shape 76" id="76"/>
           <p:cNvSpPr txBox="1"/>
           <p:nvPr>
             <p:ph type="title"/>
@@ -7200,14 +7450,14 @@
             </a:pPr>
             <a:r>
               <a:rPr lang="en-GB"/>
-              <a:t>Moving around the Zipper Tree</a:t>
+              <a:t>Moving around the Zipper tree</a:t>
             </a:r>
           </a:p>
         </p:txBody>
       </p:sp>
       <p:sp>
         <p:nvSpPr>
-          <p:cNvPr name="Shape 76" id="76"/>
+          <p:cNvPr name="Shape 77" id="77"/>
           <p:cNvSpPr txBox="1"/>
           <p:nvPr>
             <p:ph type="body" idx="1"/>
@@ -7228,7 +7478,10 @@
           </a:bodyPr>
           <a:lstStyle/>
           <a:p>
-            <a:pPr indent="0" marL="457200">
+            <a:pPr indent="0" marL="457200" rtl="0" lvl="0">
+              <a:spcAft>
+                <a:spcPts val="1000"/>
+              </a:spcAft>
               <a:buNone/>
             </a:pPr>
             <a:r>
@@ -7378,6 +7631,14 @@
               </a:rPr>
               <a:t> _ = error "Can't move down from a Leaf"</a:t>
             </a:r>
+          </a:p>
+          <a:p>
+            <a:pPr indent="0" marL="457200" rtl="0" lvl="0">
+              <a:spcAft>
+                <a:spcPts val="1000"/>
+              </a:spcAft>
+              <a:buNone/>
+            </a:pPr>
             <a:r>
               <a:rPr lang="en-GB" sz="1800">
                 <a:solidFill>
@@ -7525,6 +7786,14 @@
               </a:rPr>
               <a:t> _ = error "Can't move down from a Leaf"</a:t>
             </a:r>
+          </a:p>
+          <a:p>
+            <a:pPr indent="0" marL="457200" rtl="0" lvl="0">
+              <a:spcAft>
+                <a:spcPts val="1000"/>
+              </a:spcAft>
+              <a:buNone/>
+            </a:pPr>
             <a:r>
               <a:rPr lang="en-GB" sz="1800">
                 <a:solidFill>
@@ -7735,6 +8004,14 @@
               </a:rPr>
               <a:t> _ = error "Can't go up from the root of the Tree"</a:t>
             </a:r>
+          </a:p>
+          <a:p>
+            <a:pPr indent="0" marL="457200" rtl="0" lvl="0">
+              <a:spcAft>
+                <a:spcPts val="1000"/>
+              </a:spcAft>
+              <a:buNone/>
+            </a:pPr>
             <a:r>
               <a:rPr lang="en-GB" sz="1800">
                 <a:solidFill>
@@ -8195,283 +8472,6 @@
 </file>
 
 <file path=ppt/theme/theme2.xml><?xml version="1.0" encoding="utf-8"?>
-<a:theme xmlns:a="http://schemas.openxmlformats.org/drawingml/2006/main" xmlns:r="http://schemas.openxmlformats.org/officeDocument/2006/relationships">
-  <a:themeElements>
-    <a:clrScheme name="Custom 347">
-      <a:dk1>
-        <a:srgbClr val="000000"/>
-      </a:dk1>
-      <a:lt1>
-        <a:srgbClr val="FFFFFF"/>
-      </a:lt1>
-      <a:dk2>
-        <a:srgbClr val="666666"/>
-      </a:dk2>
-      <a:lt2>
-        <a:srgbClr val="CCCCCC"/>
-      </a:lt2>
-      <a:accent1>
-        <a:srgbClr val="3A81BA"/>
-      </a:accent1>
-      <a:accent2>
-        <a:srgbClr val="D89F39"/>
-      </a:accent2>
-      <a:accent3>
-        <a:srgbClr val="8BAB42"/>
-      </a:accent3>
-      <a:accent4>
-        <a:srgbClr val="57A7B5"/>
-      </a:accent4>
-      <a:accent5>
-        <a:srgbClr val="8B81D2"/>
-      </a:accent5>
-      <a:accent6>
-        <a:srgbClr val="963334"/>
-      </a:accent6>
-      <a:hlink>
-        <a:srgbClr val="1155CC"/>
-      </a:hlink>
-      <a:folHlink>
-        <a:srgbClr val="6611CC"/>
-      </a:folHlink>
-    </a:clrScheme>
-    <a:fontScheme name="Office">
-      <a:majorFont>
-        <a:latin typeface="Arial"/>
-        <a:ea typeface=""/>
-        <a:cs typeface=""/>
-        <a:font script="Jpan" typeface="ＭＳ Ｐゴシック"/>
-        <a:font script="Hang" typeface="맑은 고딕"/>
-        <a:font script="Hans" typeface="宋体"/>
-        <a:font script="Hant" typeface="新細明體"/>
-        <a:font script="Arab" typeface="Times New Roman"/>
-        <a:font script="Hebr" typeface="Times New Roman"/>
-        <a:font script="Thai" typeface="Angsana New"/>
-        <a:font script="Ethi" typeface="Nyala"/>
-        <a:font script="Beng" typeface="Vrinda"/>
-        <a:font script="Gujr" typeface="Shruti"/>
-        <a:font script="Khmr" typeface="MoolBoran"/>
-        <a:font script="Knda" typeface="Tunga"/>
-        <a:font script="Guru" typeface="Raavi"/>
-        <a:font script="Cans" typeface="Euphemia"/>
-        <a:font script="Cher" typeface="Plantagenet Cherokee"/>
-        <a:font script="Yiii" typeface="Microsoft Yi Baiti"/>
-        <a:font script="Tibt" typeface="Microsoft Himalaya"/>
-        <a:font script="Thaa" typeface="MV Boli"/>
-        <a:font script="Deva" typeface="Mangal"/>
-        <a:font script="Telu" typeface="Gautami"/>
-        <a:font script="Taml" typeface="Latha"/>
-        <a:font script="Syrc" typeface="Estrangelo Edessa"/>
-        <a:font script="Orya" typeface="Kalinga"/>
-        <a:font script="Mlym" typeface="Kartika"/>
-        <a:font script="Laoo" typeface="DokChampa"/>
-        <a:font script="Sinh" typeface="Iskoola Pota"/>
-        <a:font script="Mong" typeface="Mongolian Baiti"/>
-        <a:font script="Viet" typeface="Times New Roman"/>
-        <a:font script="Uigh" typeface="Microsoft Uighur"/>
-      </a:majorFont>
-      <a:minorFont>
-        <a:latin typeface="Arial"/>
-        <a:ea typeface=""/>
-        <a:cs typeface=""/>
-        <a:font script="Jpan" typeface="ＭＳ Ｐゴシック"/>
-        <a:font script="Hang" typeface="맑은 고딕"/>
-        <a:font script="Hans" typeface="宋体"/>
-        <a:font script="Hant" typeface="新細明體"/>
-        <a:font script="Arab" typeface="Arial"/>
-        <a:font script="Hebr" typeface="Arial"/>
-        <a:font script="Thai" typeface="Cordia New"/>
-        <a:font script="Ethi" typeface="Nyala"/>
-        <a:font script="Beng" typeface="Vrinda"/>
-        <a:font script="Gujr" typeface="Shruti"/>
-        <a:font script="Khmr" typeface="DaunPenh"/>
-        <a:font script="Knda" typeface="Tunga"/>
-        <a:font script="Guru" typeface="Raavi"/>
-        <a:font script="Cans" typeface="Euphemia"/>
-        <a:font script="Cher" typeface="Plantagenet Cherokee"/>
-        <a:font script="Yiii" typeface="Microsoft Yi Baiti"/>
-        <a:font script="Tibt" typeface="Microsoft Himalaya"/>
-        <a:font script="Thaa" typeface="MV Boli"/>
-        <a:font script="Deva" typeface="Mangal"/>
-        <a:font script="Telu" typeface="Gautami"/>
-        <a:font script="Taml" typeface="Latha"/>
-        <a:font script="Syrc" typeface="Estrangelo Edessa"/>
-        <a:font script="Orya" typeface="Kalinga"/>
-        <a:font script="Mlym" typeface="Kartika"/>
-        <a:font script="Laoo" typeface="DokChampa"/>
-        <a:font script="Sinh" typeface="Iskoola Pota"/>
-        <a:font script="Mong" typeface="Mongolian Baiti"/>
-        <a:font script="Viet" typeface="Arial"/>
-        <a:font script="Uigh" typeface="Microsoft Uighur"/>
-      </a:minorFont>
-    </a:fontScheme>
-    <a:fmtScheme name="Office">
-      <a:fillStyleLst>
-        <a:solidFill>
-          <a:schemeClr val="phClr"/>
-        </a:solidFill>
-        <a:gradFill rotWithShape="1">
-          <a:gsLst>
-            <a:gs pos="0">
-              <a:schemeClr val="phClr">
-                <a:tint val="50000"/>
-                <a:satMod val="300000"/>
-              </a:schemeClr>
-            </a:gs>
-            <a:gs pos="35000">
-              <a:schemeClr val="phClr">
-                <a:tint val="37000"/>
-                <a:satMod val="300000"/>
-              </a:schemeClr>
-            </a:gs>
-            <a:gs pos="100000">
-              <a:schemeClr val="phClr">
-                <a:tint val="15000"/>
-                <a:satMod val="350000"/>
-              </a:schemeClr>
-            </a:gs>
-          </a:gsLst>
-          <a:lin scaled="1" ang="16200000"/>
-        </a:gradFill>
-        <a:gradFill rotWithShape="1">
-          <a:gsLst>
-            <a:gs pos="0">
-              <a:schemeClr val="phClr">
-                <a:tint val="100000"/>
-                <a:shade val="100000"/>
-                <a:satMod val="130000"/>
-              </a:schemeClr>
-            </a:gs>
-            <a:gs pos="100000">
-              <a:schemeClr val="phClr">
-                <a:tint val="50000"/>
-                <a:shade val="100000"/>
-                <a:satMod val="350000"/>
-              </a:schemeClr>
-            </a:gs>
-          </a:gsLst>
-          <a:lin scaled="0" ang="16200000"/>
-        </a:gradFill>
-      </a:fillStyleLst>
-      <a:lnStyleLst>
-        <a:ln w="9525" cap="flat" cmpd="sng" algn="ctr">
-          <a:solidFill>
-            <a:schemeClr val="phClr">
-              <a:shade val="95000"/>
-              <a:satMod val="105000"/>
-            </a:schemeClr>
-          </a:solidFill>
-          <a:prstDash val="solid"/>
-        </a:ln>
-        <a:ln w="25400" cap="flat" cmpd="sng" algn="ctr">
-          <a:solidFill>
-            <a:schemeClr val="phClr"/>
-          </a:solidFill>
-          <a:prstDash val="solid"/>
-        </a:ln>
-        <a:ln w="38100" cap="flat" cmpd="sng" algn="ctr">
-          <a:solidFill>
-            <a:schemeClr val="phClr"/>
-          </a:solidFill>
-          <a:prstDash val="solid"/>
-        </a:ln>
-      </a:lnStyleLst>
-      <a:effectStyleLst>
-        <a:effectStyle>
-          <a:effectLst>
-            <a:outerShdw rotWithShape="0" dir="5400000" dist="20000" blurRad="40000">
-              <a:srgbClr val="000000">
-                <a:alpha val="38000"/>
-              </a:srgbClr>
-            </a:outerShdw>
-          </a:effectLst>
-        </a:effectStyle>
-        <a:effectStyle>
-          <a:effectLst>
-            <a:outerShdw rotWithShape="0" dir="5400000" dist="23000" blurRad="40000">
-              <a:srgbClr val="000000">
-                <a:alpha val="35000"/>
-              </a:srgbClr>
-            </a:outerShdw>
-          </a:effectLst>
-        </a:effectStyle>
-        <a:effectStyle>
-          <a:effectLst>
-            <a:outerShdw rotWithShape="0" dir="5400000" dist="23000" blurRad="40000">
-              <a:srgbClr val="000000">
-                <a:alpha val="35000"/>
-              </a:srgbClr>
-            </a:outerShdw>
-          </a:effectLst>
-          <a:scene3d>
-            <a:camera prst="orthographicFront">
-              <a:rot rev="0" lat="0" lon="0"/>
-            </a:camera>
-            <a:lightRig rig="threePt" dir="t">
-              <a:rot rev="1200000" lat="0" lon="0"/>
-            </a:lightRig>
-          </a:scene3d>
-          <a:sp3d>
-            <a:bevelT w="63500" h="25400"/>
-          </a:sp3d>
-        </a:effectStyle>
-      </a:effectStyleLst>
-      <a:bgFillStyleLst>
-        <a:solidFill>
-          <a:schemeClr val="phClr"/>
-        </a:solidFill>
-        <a:gradFill rotWithShape="1">
-          <a:gsLst>
-            <a:gs pos="0">
-              <a:schemeClr val="phClr">
-                <a:tint val="40000"/>
-                <a:satMod val="350000"/>
-              </a:schemeClr>
-            </a:gs>
-            <a:gs pos="40000">
-              <a:schemeClr val="phClr">
-                <a:tint val="45000"/>
-                <a:shade val="99000"/>
-                <a:satMod val="350000"/>
-              </a:schemeClr>
-            </a:gs>
-            <a:gs pos="100000">
-              <a:schemeClr val="phClr">
-                <a:shade val="20000"/>
-                <a:satMod val="255000"/>
-              </a:schemeClr>
-            </a:gs>
-          </a:gsLst>
-          <a:path path="circle">
-            <a:fillToRect b="180000" l="50000" t="-80000" r="50000"/>
-          </a:path>
-        </a:gradFill>
-        <a:gradFill rotWithShape="1">
-          <a:gsLst>
-            <a:gs pos="0">
-              <a:schemeClr val="phClr">
-                <a:tint val="80000"/>
-                <a:satMod val="300000"/>
-              </a:schemeClr>
-            </a:gs>
-            <a:gs pos="100000">
-              <a:schemeClr val="phClr">
-                <a:shade val="30000"/>
-                <a:satMod val="200000"/>
-              </a:schemeClr>
-            </a:gs>
-          </a:gsLst>
-          <a:path path="circle">
-            <a:fillToRect b="50000" l="50000" t="50000" r="50000"/>
-          </a:path>
-        </a:gradFill>
-      </a:bgFillStyleLst>
-    </a:fmtScheme>
-  </a:themeElements>
-</a:theme>
-</file>
-
-<file path=ppt/theme/theme3.xml><?xml version="1.0" encoding="utf-8"?>
 <a:theme xmlns:a="http://schemas.openxmlformats.org/drawingml/2006/main" xmlns:r="http://schemas.openxmlformats.org/officeDocument/2006/relationships" name="Office Theme">
   <a:themeElements>
     <a:clrScheme name="Office">
@@ -8787,4 +8787,281 @@
   </a:objectDefaults>
   <a:extraClrSchemeLst/>
 </a:theme>
+</file>
+
+<file path=ppt/theme/theme3.xml><?xml version="1.0" encoding="utf-8"?>
+<a:theme xmlns:a="http://schemas.openxmlformats.org/drawingml/2006/main" xmlns:r="http://schemas.openxmlformats.org/officeDocument/2006/relationships">
+  <a:themeElements>
+    <a:clrScheme name="Custom 347">
+      <a:dk1>
+        <a:srgbClr val="000000"/>
+      </a:dk1>
+      <a:lt1>
+        <a:srgbClr val="FFFFFF"/>
+      </a:lt1>
+      <a:dk2>
+        <a:srgbClr val="666666"/>
+      </a:dk2>
+      <a:lt2>
+        <a:srgbClr val="CCCCCC"/>
+      </a:lt2>
+      <a:accent1>
+        <a:srgbClr val="3A81BA"/>
+      </a:accent1>
+      <a:accent2>
+        <a:srgbClr val="D89F39"/>
+      </a:accent2>
+      <a:accent3>
+        <a:srgbClr val="8BAB42"/>
+      </a:accent3>
+      <a:accent4>
+        <a:srgbClr val="57A7B5"/>
+      </a:accent4>
+      <a:accent5>
+        <a:srgbClr val="8B81D2"/>
+      </a:accent5>
+      <a:accent6>
+        <a:srgbClr val="963334"/>
+      </a:accent6>
+      <a:hlink>
+        <a:srgbClr val="1155CC"/>
+      </a:hlink>
+      <a:folHlink>
+        <a:srgbClr val="6611CC"/>
+      </a:folHlink>
+    </a:clrScheme>
+    <a:fontScheme name="Office">
+      <a:majorFont>
+        <a:latin typeface="Arial"/>
+        <a:ea typeface=""/>
+        <a:cs typeface=""/>
+        <a:font script="Jpan" typeface="ＭＳ Ｐゴシック"/>
+        <a:font script="Hang" typeface="맑은 고딕"/>
+        <a:font script="Hans" typeface="宋体"/>
+        <a:font script="Hant" typeface="新細明體"/>
+        <a:font script="Arab" typeface="Times New Roman"/>
+        <a:font script="Hebr" typeface="Times New Roman"/>
+        <a:font script="Thai" typeface="Angsana New"/>
+        <a:font script="Ethi" typeface="Nyala"/>
+        <a:font script="Beng" typeface="Vrinda"/>
+        <a:font script="Gujr" typeface="Shruti"/>
+        <a:font script="Khmr" typeface="MoolBoran"/>
+        <a:font script="Knda" typeface="Tunga"/>
+        <a:font script="Guru" typeface="Raavi"/>
+        <a:font script="Cans" typeface="Euphemia"/>
+        <a:font script="Cher" typeface="Plantagenet Cherokee"/>
+        <a:font script="Yiii" typeface="Microsoft Yi Baiti"/>
+        <a:font script="Tibt" typeface="Microsoft Himalaya"/>
+        <a:font script="Thaa" typeface="MV Boli"/>
+        <a:font script="Deva" typeface="Mangal"/>
+        <a:font script="Telu" typeface="Gautami"/>
+        <a:font script="Taml" typeface="Latha"/>
+        <a:font script="Syrc" typeface="Estrangelo Edessa"/>
+        <a:font script="Orya" typeface="Kalinga"/>
+        <a:font script="Mlym" typeface="Kartika"/>
+        <a:font script="Laoo" typeface="DokChampa"/>
+        <a:font script="Sinh" typeface="Iskoola Pota"/>
+        <a:font script="Mong" typeface="Mongolian Baiti"/>
+        <a:font script="Viet" typeface="Times New Roman"/>
+        <a:font script="Uigh" typeface="Microsoft Uighur"/>
+      </a:majorFont>
+      <a:minorFont>
+        <a:latin typeface="Arial"/>
+        <a:ea typeface=""/>
+        <a:cs typeface=""/>
+        <a:font script="Jpan" typeface="ＭＳ Ｐゴシック"/>
+        <a:font script="Hang" typeface="맑은 고딕"/>
+        <a:font script="Hans" typeface="宋体"/>
+        <a:font script="Hant" typeface="新細明體"/>
+        <a:font script="Arab" typeface="Arial"/>
+        <a:font script="Hebr" typeface="Arial"/>
+        <a:font script="Thai" typeface="Cordia New"/>
+        <a:font script="Ethi" typeface="Nyala"/>
+        <a:font script="Beng" typeface="Vrinda"/>
+        <a:font script="Gujr" typeface="Shruti"/>
+        <a:font script="Khmr" typeface="DaunPenh"/>
+        <a:font script="Knda" typeface="Tunga"/>
+        <a:font script="Guru" typeface="Raavi"/>
+        <a:font script="Cans" typeface="Euphemia"/>
+        <a:font script="Cher" typeface="Plantagenet Cherokee"/>
+        <a:font script="Yiii" typeface="Microsoft Yi Baiti"/>
+        <a:font script="Tibt" typeface="Microsoft Himalaya"/>
+        <a:font script="Thaa" typeface="MV Boli"/>
+        <a:font script="Deva" typeface="Mangal"/>
+        <a:font script="Telu" typeface="Gautami"/>
+        <a:font script="Taml" typeface="Latha"/>
+        <a:font script="Syrc" typeface="Estrangelo Edessa"/>
+        <a:font script="Orya" typeface="Kalinga"/>
+        <a:font script="Mlym" typeface="Kartika"/>
+        <a:font script="Laoo" typeface="DokChampa"/>
+        <a:font script="Sinh" typeface="Iskoola Pota"/>
+        <a:font script="Mong" typeface="Mongolian Baiti"/>
+        <a:font script="Viet" typeface="Arial"/>
+        <a:font script="Uigh" typeface="Microsoft Uighur"/>
+      </a:minorFont>
+    </a:fontScheme>
+    <a:fmtScheme name="Office">
+      <a:fillStyleLst>
+        <a:solidFill>
+          <a:schemeClr val="phClr"/>
+        </a:solidFill>
+        <a:gradFill rotWithShape="1">
+          <a:gsLst>
+            <a:gs pos="0">
+              <a:schemeClr val="phClr">
+                <a:tint val="50000"/>
+                <a:satMod val="300000"/>
+              </a:schemeClr>
+            </a:gs>
+            <a:gs pos="35000">
+              <a:schemeClr val="phClr">
+                <a:tint val="37000"/>
+                <a:satMod val="300000"/>
+              </a:schemeClr>
+            </a:gs>
+            <a:gs pos="100000">
+              <a:schemeClr val="phClr">
+                <a:tint val="15000"/>
+                <a:satMod val="350000"/>
+              </a:schemeClr>
+            </a:gs>
+          </a:gsLst>
+          <a:lin scaled="1" ang="16200000"/>
+        </a:gradFill>
+        <a:gradFill rotWithShape="1">
+          <a:gsLst>
+            <a:gs pos="0">
+              <a:schemeClr val="phClr">
+                <a:tint val="100000"/>
+                <a:shade val="100000"/>
+                <a:satMod val="130000"/>
+              </a:schemeClr>
+            </a:gs>
+            <a:gs pos="100000">
+              <a:schemeClr val="phClr">
+                <a:tint val="50000"/>
+                <a:shade val="100000"/>
+                <a:satMod val="350000"/>
+              </a:schemeClr>
+            </a:gs>
+          </a:gsLst>
+          <a:lin scaled="0" ang="16200000"/>
+        </a:gradFill>
+      </a:fillStyleLst>
+      <a:lnStyleLst>
+        <a:ln w="9525" cap="flat" cmpd="sng" algn="ctr">
+          <a:solidFill>
+            <a:schemeClr val="phClr">
+              <a:shade val="95000"/>
+              <a:satMod val="105000"/>
+            </a:schemeClr>
+          </a:solidFill>
+          <a:prstDash val="solid"/>
+        </a:ln>
+        <a:ln w="25400" cap="flat" cmpd="sng" algn="ctr">
+          <a:solidFill>
+            <a:schemeClr val="phClr"/>
+          </a:solidFill>
+          <a:prstDash val="solid"/>
+        </a:ln>
+        <a:ln w="38100" cap="flat" cmpd="sng" algn="ctr">
+          <a:solidFill>
+            <a:schemeClr val="phClr"/>
+          </a:solidFill>
+          <a:prstDash val="solid"/>
+        </a:ln>
+      </a:lnStyleLst>
+      <a:effectStyleLst>
+        <a:effectStyle>
+          <a:effectLst>
+            <a:outerShdw rotWithShape="0" dir="5400000" dist="20000" blurRad="40000">
+              <a:srgbClr val="000000">
+                <a:alpha val="38000"/>
+              </a:srgbClr>
+            </a:outerShdw>
+          </a:effectLst>
+        </a:effectStyle>
+        <a:effectStyle>
+          <a:effectLst>
+            <a:outerShdw rotWithShape="0" dir="5400000" dist="23000" blurRad="40000">
+              <a:srgbClr val="000000">
+                <a:alpha val="35000"/>
+              </a:srgbClr>
+            </a:outerShdw>
+          </a:effectLst>
+        </a:effectStyle>
+        <a:effectStyle>
+          <a:effectLst>
+            <a:outerShdw rotWithShape="0" dir="5400000" dist="23000" blurRad="40000">
+              <a:srgbClr val="000000">
+                <a:alpha val="35000"/>
+              </a:srgbClr>
+            </a:outerShdw>
+          </a:effectLst>
+          <a:scene3d>
+            <a:camera prst="orthographicFront">
+              <a:rot rev="0" lat="0" lon="0"/>
+            </a:camera>
+            <a:lightRig rig="threePt" dir="t">
+              <a:rot rev="1200000" lat="0" lon="0"/>
+            </a:lightRig>
+          </a:scene3d>
+          <a:sp3d>
+            <a:bevelT w="63500" h="25400"/>
+          </a:sp3d>
+        </a:effectStyle>
+      </a:effectStyleLst>
+      <a:bgFillStyleLst>
+        <a:solidFill>
+          <a:schemeClr val="phClr"/>
+        </a:solidFill>
+        <a:gradFill rotWithShape="1">
+          <a:gsLst>
+            <a:gs pos="0">
+              <a:schemeClr val="phClr">
+                <a:tint val="40000"/>
+                <a:satMod val="350000"/>
+              </a:schemeClr>
+            </a:gs>
+            <a:gs pos="40000">
+              <a:schemeClr val="phClr">
+                <a:tint val="45000"/>
+                <a:shade val="99000"/>
+                <a:satMod val="350000"/>
+              </a:schemeClr>
+            </a:gs>
+            <a:gs pos="100000">
+              <a:schemeClr val="phClr">
+                <a:shade val="20000"/>
+                <a:satMod val="255000"/>
+              </a:schemeClr>
+            </a:gs>
+          </a:gsLst>
+          <a:path path="circle">
+            <a:fillToRect b="180000" l="50000" t="-80000" r="50000"/>
+          </a:path>
+        </a:gradFill>
+        <a:gradFill rotWithShape="1">
+          <a:gsLst>
+            <a:gs pos="0">
+              <a:schemeClr val="phClr">
+                <a:tint val="80000"/>
+                <a:satMod val="300000"/>
+              </a:schemeClr>
+            </a:gs>
+            <a:gs pos="100000">
+              <a:schemeClr val="phClr">
+                <a:shade val="30000"/>
+                <a:satMod val="200000"/>
+              </a:schemeClr>
+            </a:gs>
+          </a:gsLst>
+          <a:path path="circle">
+            <a:fillToRect b="50000" l="50000" t="50000" r="50000"/>
+          </a:path>
+        </a:gradFill>
+      </a:bgFillStyleLst>
+    </a:fmtScheme>
+  </a:themeElements>
+</a:theme>
 </file>
</xml_diff>

<commit_message>
Tweaked slides (not a search tree)
</commit_message>
<xml_diff>
--- a/Slides/The Zipper.pptx
+++ b/Slides/The Zipper.pptx
@@ -4873,7 +4873,7 @@
             </a:pPr>
             <a:r>
               <a:rPr lang="en-GB"/>
-              <a:t>This presentation introduces the Zipper in the context of a simple binary search tree, but...</a:t>
+              <a:t>This presentation introduces the Zipper in the context of a simple binary tree, but...</a:t>
             </a:r>
           </a:p>
           <a:p>
@@ -4948,7 +4948,7 @@
             </a:pPr>
             <a:r>
               <a:rPr lang="en-GB"/>
-              <a:t>A simple binary search tree</a:t>
+              <a:t>A simple binary tree</a:t>
             </a:r>
           </a:p>
         </p:txBody>
@@ -6541,7 +6541,7 @@
             </a:pPr>
             <a:r>
               <a:rPr lang="en-GB"/>
-              <a:t>Every time we want to inspect or modify the focus of interest we must traverse the Tree.</a:t>
+              <a:t>Every time we want to inspect or modify the focus of interest we must traverse the tree.</a:t>
             </a:r>
           </a:p>
           <a:p>
@@ -8197,7 +8197,7 @@
 <file path=ppt/theme/theme1.xml><?xml version="1.0" encoding="utf-8"?>
 <a:theme xmlns:a="http://schemas.openxmlformats.org/drawingml/2006/main" xmlns:r="http://schemas.openxmlformats.org/officeDocument/2006/relationships">
   <a:themeElements>
-    <a:clrScheme name="Default">
+    <a:clrScheme name="Custom 347">
       <a:dk1>
         <a:srgbClr val="000000"/>
       </a:dk1>
@@ -8205,34 +8205,34 @@
         <a:srgbClr val="FFFFFF"/>
       </a:lt1>
       <a:dk2>
-        <a:srgbClr val="158158"/>
+        <a:srgbClr val="666666"/>
       </a:dk2>
       <a:lt2>
-        <a:srgbClr val="F3F3F3"/>
+        <a:srgbClr val="CCCCCC"/>
       </a:lt2>
       <a:accent1>
-        <a:srgbClr val="058DC7"/>
+        <a:srgbClr val="3A81BA"/>
       </a:accent1>
       <a:accent2>
-        <a:srgbClr val="50B432"/>
+        <a:srgbClr val="D89F39"/>
       </a:accent2>
       <a:accent3>
-        <a:srgbClr val="ED561B"/>
+        <a:srgbClr val="8BAB42"/>
       </a:accent3>
       <a:accent4>
-        <a:srgbClr val="EDEF00"/>
+        <a:srgbClr val="57A7B5"/>
       </a:accent4>
       <a:accent5>
-        <a:srgbClr val="24CBE5"/>
+        <a:srgbClr val="8B81D2"/>
       </a:accent5>
       <a:accent6>
-        <a:srgbClr val="64E572"/>
+        <a:srgbClr val="963334"/>
       </a:accent6>
       <a:hlink>
-        <a:srgbClr val="2200CC"/>
+        <a:srgbClr val="1155CC"/>
       </a:hlink>
       <a:folHlink>
-        <a:srgbClr val="551A8B"/>
+        <a:srgbClr val="6611CC"/>
       </a:folHlink>
     </a:clrScheme>
     <a:fontScheme name="Office">
@@ -8792,7 +8792,7 @@
 <file path=ppt/theme/theme3.xml><?xml version="1.0" encoding="utf-8"?>
 <a:theme xmlns:a="http://schemas.openxmlformats.org/drawingml/2006/main" xmlns:r="http://schemas.openxmlformats.org/officeDocument/2006/relationships">
   <a:themeElements>
-    <a:clrScheme name="Custom 347">
+    <a:clrScheme name="Default">
       <a:dk1>
         <a:srgbClr val="000000"/>
       </a:dk1>
@@ -8800,34 +8800,34 @@
         <a:srgbClr val="FFFFFF"/>
       </a:lt1>
       <a:dk2>
-        <a:srgbClr val="666666"/>
+        <a:srgbClr val="158158"/>
       </a:dk2>
       <a:lt2>
-        <a:srgbClr val="CCCCCC"/>
+        <a:srgbClr val="F3F3F3"/>
       </a:lt2>
       <a:accent1>
-        <a:srgbClr val="3A81BA"/>
+        <a:srgbClr val="058DC7"/>
       </a:accent1>
       <a:accent2>
-        <a:srgbClr val="D89F39"/>
+        <a:srgbClr val="50B432"/>
       </a:accent2>
       <a:accent3>
-        <a:srgbClr val="8BAB42"/>
+        <a:srgbClr val="ED561B"/>
       </a:accent3>
       <a:accent4>
-        <a:srgbClr val="57A7B5"/>
+        <a:srgbClr val="EDEF00"/>
       </a:accent4>
       <a:accent5>
-        <a:srgbClr val="8B81D2"/>
+        <a:srgbClr val="24CBE5"/>
       </a:accent5>
       <a:accent6>
-        <a:srgbClr val="963334"/>
+        <a:srgbClr val="64E572"/>
       </a:accent6>
       <a:hlink>
-        <a:srgbClr val="1155CC"/>
+        <a:srgbClr val="2200CC"/>
       </a:hlink>
       <a:folHlink>
-        <a:srgbClr val="6611CC"/>
+        <a:srgbClr val="551A8B"/>
       </a:folHlink>
     </a:clrScheme>
     <a:fontScheme name="Office">

</xml_diff>